<commit_message>
Added Diagram - Manual upload
</commit_message>
<xml_diff>
--- a/CSSE4011 Poster - Group L.pptx
+++ b/CSSE4011 Poster - Group L.pptx
@@ -253,7 +253,7 @@
               <a:pPr>
                 <a:defRPr/>
               </a:pPr>
-              <a:t>6/6/2018</a:t>
+              <a:t>6/7/2018</a:t>
             </a:fld>
             <a:endParaRPr lang="en-US"/>
           </a:p>
@@ -763,7 +763,7 @@
               <a:pPr>
                 <a:defRPr/>
               </a:pPr>
-              <a:t>6/6/2018</a:t>
+              <a:t>6/7/2018</a:t>
             </a:fld>
             <a:endParaRPr lang="en-US"/>
           </a:p>
@@ -1569,14 +1569,14 @@
           </a:ln>
           <a:extLst>
             <a:ext uri="{909E8E84-426E-40dd-AFC4-6F175D3DCCD1}">
-              <a14:hiddenFill xmlns:a14="http://schemas.microsoft.com/office/drawing/2010/main" xmlns="">
+              <a14:hiddenFill xmlns="" xmlns:a14="http://schemas.microsoft.com/office/drawing/2010/main">
                 <a:solidFill>
                   <a:srgbClr val="FFFFFF"/>
                 </a:solidFill>
               </a14:hiddenFill>
             </a:ext>
             <a:ext uri="{91240B29-F687-4f45-9708-019B960494DF}">
-              <a14:hiddenLine xmlns:a14="http://schemas.microsoft.com/office/drawing/2010/main" xmlns="" w="9525">
+              <a14:hiddenLine xmlns="" xmlns:a14="http://schemas.microsoft.com/office/drawing/2010/main" w="9525">
                 <a:solidFill>
                   <a:srgbClr val="000000"/>
                 </a:solidFill>
@@ -1628,14 +1628,14 @@
           </a:ln>
           <a:extLst>
             <a:ext uri="{909E8E84-426E-40dd-AFC4-6F175D3DCCD1}">
-              <a14:hiddenFill xmlns:a14="http://schemas.microsoft.com/office/drawing/2010/main" xmlns="">
+              <a14:hiddenFill xmlns="" xmlns:a14="http://schemas.microsoft.com/office/drawing/2010/main">
                 <a:solidFill>
                   <a:srgbClr val="FFFFFF"/>
                 </a:solidFill>
               </a14:hiddenFill>
             </a:ext>
             <a:ext uri="{91240B29-F687-4f45-9708-019B960494DF}">
-              <a14:hiddenLine xmlns:a14="http://schemas.microsoft.com/office/drawing/2010/main" xmlns="" w="9525">
+              <a14:hiddenLine xmlns="" xmlns:a14="http://schemas.microsoft.com/office/drawing/2010/main" w="9525">
                 <a:solidFill>
                   <a:srgbClr val="000000"/>
                 </a:solidFill>
@@ -1735,7 +1735,7 @@
               <a:pPr>
                 <a:defRPr/>
               </a:pPr>
-              <a:t>6/6/2018</a:t>
+              <a:t>6/7/2018</a:t>
             </a:fld>
             <a:endParaRPr lang="en-US"/>
           </a:p>
@@ -2301,21 +2301,7 @@
                 <a:latin typeface="Helvetica Neue" charset="0"/>
                 <a:cs typeface="Helvetica Neue" charset="0"/>
               </a:rPr>
-              <a:t>Develop a </a:t>
-            </a:r>
-            <a:r>
-              <a:rPr lang="en-US" b="1" dirty="0" smtClean="0">
-                <a:latin typeface="Helvetica Neue" charset="0"/>
-                <a:cs typeface="Helvetica Neue" charset="0"/>
-              </a:rPr>
-              <a:t>car racing controller to a</a:t>
-            </a:r>
-            <a:r>
-              <a:rPr lang="en-US" b="1" dirty="0" smtClean="0">
-                <a:latin typeface="Helvetica Neue" charset="0"/>
-                <a:cs typeface="Helvetica Neue" charset="0"/>
-              </a:rPr>
-              <a:t>ssist </a:t>
+              <a:t>Develop a car racing controller to assist </a:t>
             </a:r>
             <a:r>
               <a:rPr lang="en-US" b="1" dirty="0">
@@ -2746,25 +2732,7 @@
               <a:rPr lang="en-AU" dirty="0" smtClean="0">
                 <a:latin typeface="Helvetica Neue" charset="0"/>
               </a:rPr>
-              <a:t>The muscle sensors can </a:t>
-            </a:r>
-            <a:r>
-              <a:rPr lang="en-AU" dirty="0" smtClean="0">
-                <a:latin typeface="Helvetica Neue" charset="0"/>
-              </a:rPr>
-              <a:t>detect muscle activation by measuring </a:t>
-            </a:r>
-            <a:r>
-              <a:rPr lang="en-AU" dirty="0" smtClean="0">
-                <a:latin typeface="Helvetica Neue" charset="0"/>
-              </a:rPr>
-              <a:t>the electromyography signals emitted by your muscles</a:t>
-            </a:r>
-            <a:r>
-              <a:rPr lang="en-AU" dirty="0" smtClean="0">
-                <a:latin typeface="Helvetica Neue" charset="0"/>
-              </a:rPr>
-              <a:t>!</a:t>
+              <a:t>The muscle sensors can detect muscle activation by measuring the electromyography signals emitted by your muscles!</a:t>
             </a:r>
           </a:p>
           <a:p>
@@ -2787,9 +2755,6 @@
               </a:rPr>
               <a:t>[Possible graph of output waveform or sensor positioning]</a:t>
             </a:r>
-            <a:endParaRPr lang="en-AU" dirty="0" smtClean="0">
-              <a:latin typeface="Helvetica Neue" charset="0"/>
-            </a:endParaRPr>
           </a:p>
           <a:p>
             <a:endParaRPr lang="en-AU" dirty="0">
@@ -3112,256 +3077,62 @@
           </a:extLst>
         </p:spPr>
       </p:pic>
+      <p:pic>
+        <p:nvPicPr>
+          <p:cNvPr id="2" name="Picture 1"/>
+          <p:cNvPicPr>
+            <a:picLocks noChangeAspect="1"/>
+          </p:cNvPicPr>
+          <p:nvPr/>
+        </p:nvPicPr>
+        <p:blipFill>
+          <a:blip r:embed="rId3"/>
+          <a:stretch>
+            <a:fillRect/>
+          </a:stretch>
+        </p:blipFill>
+        <p:spPr>
+          <a:xfrm>
+            <a:off x="7908482" y="6350532"/>
+            <a:ext cx="6115935" cy="3172881"/>
+          </a:xfrm>
+          <a:prstGeom prst="rect">
+            <a:avLst/>
+          </a:prstGeom>
+        </p:spPr>
+      </p:pic>
       <p:sp>
         <p:nvSpPr>
-          <p:cNvPr id="9" name="Content Placeholder 8"/>
-          <p:cNvSpPr txBox="1">
-            <a:spLocks/>
-          </p:cNvSpPr>
+          <p:cNvPr id="3" name="TextBox 2"/>
+          <p:cNvSpPr txBox="1"/>
           <p:nvPr/>
         </p:nvSpPr>
-        <p:spPr bwMode="auto">
+        <p:spPr>
           <a:xfrm>
-            <a:off x="7466014" y="5956663"/>
-            <a:ext cx="7177086" cy="4150722"/>
+            <a:off x="11377748" y="9278083"/>
+            <a:ext cx="2795452" cy="307777"/>
           </a:xfrm>
           <a:prstGeom prst="rect">
             <a:avLst/>
           </a:prstGeom>
           <a:noFill/>
-          <a:ln w="47625">
-            <a:solidFill>
-              <a:schemeClr val="accent1"/>
-            </a:solidFill>
-            <a:miter lim="800000"/>
-            <a:headEnd/>
-            <a:tailEnd/>
-          </a:ln>
-          <a:extLst>
-            <a:ext uri="{909E8E84-426E-40dd-AFC4-6F175D3DCCD1}">
-              <a14:hiddenFill xmlns:a14="http://schemas.microsoft.com/office/drawing/2010/main" xmlns="">
-                <a:solidFill>
-                  <a:srgbClr val="FFFFFF"/>
-                </a:solidFill>
-              </a14:hiddenFill>
-            </a:ext>
-            <a:ext uri="{91240B29-F687-4f45-9708-019B960494DF}">
-              <a14:hiddenLine xmlns:a14="http://schemas.microsoft.com/office/drawing/2010/main" xmlns="" w="9525">
-                <a:solidFill>
-                  <a:srgbClr val="000000"/>
-                </a:solidFill>
-                <a:miter lim="800000"/>
-                <a:headEnd/>
-                <a:tailEnd/>
-              </a14:hiddenLine>
-            </a:ext>
-          </a:extLst>
         </p:spPr>
         <p:txBody>
-          <a:bodyPr vert="horz" wrap="square" lIns="143378" tIns="71689" rIns="143378" bIns="71689" numCol="1" anchor="t" anchorCtr="0" compatLnSpc="1">
-            <a:prstTxWarp prst="textNoShape">
-              <a:avLst/>
-            </a:prstTxWarp>
+          <a:bodyPr wrap="square" rtlCol="0">
+            <a:spAutoFit/>
           </a:bodyPr>
-          <a:lstStyle>
-            <a:lvl1pPr marL="0" indent="0" algn="l" defTabSz="715963" rtl="0" eaLnBrk="0" fontAlgn="base" hangingPunct="0">
-              <a:spcBef>
-                <a:spcPct val="20000"/>
-              </a:spcBef>
-              <a:spcAft>
-                <a:spcPct val="0"/>
-              </a:spcAft>
-              <a:buFont typeface="Arial" charset="0"/>
-              <a:buNone/>
-              <a:defRPr sz="1400" kern="1200">
-                <a:solidFill>
-                  <a:schemeClr val="tx1"/>
-                </a:solidFill>
-                <a:latin typeface="Helvetica Neue"/>
-                <a:ea typeface="Geneva" charset="-128"/>
+          <a:lstStyle/>
+          <a:p>
+            <a:r>
+              <a:rPr lang="en-AU" sz="1400" dirty="0">
+                <a:latin typeface="Helvetica Neue" charset="0"/>
                 <a:cs typeface="Helvetica Neue"/>
-              </a:defRPr>
-            </a:lvl1pPr>
-            <a:lvl2pPr marL="1163638" indent="-447675" algn="l" defTabSz="715963" rtl="0" eaLnBrk="0" fontAlgn="base" hangingPunct="0">
-              <a:spcBef>
-                <a:spcPct val="20000"/>
-              </a:spcBef>
-              <a:spcAft>
-                <a:spcPct val="0"/>
-              </a:spcAft>
-              <a:buFont typeface="Arial" charset="0"/>
-              <a:buNone/>
-              <a:defRPr sz="1800" kern="1200">
-                <a:solidFill>
-                  <a:schemeClr val="tx1"/>
-                </a:solidFill>
-                <a:latin typeface="Helvetica Neue"/>
-                <a:ea typeface="Geneva" charset="-128"/>
-                <a:cs typeface="Helvetica Neue"/>
-              </a:defRPr>
-            </a:lvl2pPr>
-            <a:lvl3pPr marL="1790700" indent="-357188" algn="l" defTabSz="715963" rtl="0" eaLnBrk="0" fontAlgn="base" hangingPunct="0">
-              <a:spcBef>
-                <a:spcPct val="20000"/>
-              </a:spcBef>
-              <a:spcAft>
-                <a:spcPct val="0"/>
-              </a:spcAft>
-              <a:buFont typeface="Arial" charset="0"/>
-              <a:buNone/>
-              <a:defRPr sz="1800" kern="1200">
-                <a:solidFill>
-                  <a:schemeClr val="tx1"/>
-                </a:solidFill>
-                <a:latin typeface="Helvetica Neue"/>
-                <a:ea typeface="Geneva" charset="-128"/>
-                <a:cs typeface="Helvetica Neue"/>
-              </a:defRPr>
-            </a:lvl3pPr>
-            <a:lvl4pPr marL="2508250" indent="-357188" algn="l" defTabSz="715963" rtl="0" eaLnBrk="0" fontAlgn="base" hangingPunct="0">
-              <a:spcBef>
-                <a:spcPct val="20000"/>
-              </a:spcBef>
-              <a:spcAft>
-                <a:spcPct val="0"/>
-              </a:spcAft>
-              <a:buFont typeface="Arial" charset="0"/>
-              <a:buNone/>
-              <a:defRPr sz="1800" kern="1200">
-                <a:solidFill>
-                  <a:schemeClr val="tx1"/>
-                </a:solidFill>
-                <a:latin typeface="Helvetica Neue"/>
-                <a:ea typeface="Geneva" charset="-128"/>
-                <a:cs typeface="Helvetica Neue"/>
-              </a:defRPr>
-            </a:lvl4pPr>
-            <a:lvl5pPr marL="3225800" indent="-357188" algn="l" defTabSz="715963" rtl="0" eaLnBrk="0" fontAlgn="base" hangingPunct="0">
-              <a:spcBef>
-                <a:spcPct val="20000"/>
-              </a:spcBef>
-              <a:spcAft>
-                <a:spcPct val="0"/>
-              </a:spcAft>
-              <a:buFont typeface="Arial" charset="0"/>
-              <a:buNone/>
-              <a:defRPr sz="1800" kern="1200">
-                <a:solidFill>
-                  <a:schemeClr val="tx1"/>
-                </a:solidFill>
-                <a:latin typeface="Helvetica Neue"/>
-                <a:ea typeface="Geneva" charset="-128"/>
-                <a:cs typeface="Helvetica Neue"/>
-              </a:defRPr>
-            </a:lvl5pPr>
-            <a:lvl6pPr marL="3942893" indent="-358445" algn="l" defTabSz="716890" rtl="0" eaLnBrk="1" latinLnBrk="0" hangingPunct="1">
-              <a:spcBef>
-                <a:spcPct val="20000"/>
-              </a:spcBef>
-              <a:buFont typeface="Arial"/>
-              <a:buChar char="•"/>
-              <a:defRPr sz="3100" kern="1200">
-                <a:solidFill>
-                  <a:schemeClr val="tx1"/>
-                </a:solidFill>
-                <a:latin typeface="+mn-lt"/>
-                <a:ea typeface="+mn-ea"/>
-                <a:cs typeface="+mn-cs"/>
-              </a:defRPr>
-            </a:lvl6pPr>
-            <a:lvl7pPr marL="4659782" indent="-358445" algn="l" defTabSz="716890" rtl="0" eaLnBrk="1" latinLnBrk="0" hangingPunct="1">
-              <a:spcBef>
-                <a:spcPct val="20000"/>
-              </a:spcBef>
-              <a:buFont typeface="Arial"/>
-              <a:buChar char="•"/>
-              <a:defRPr sz="3100" kern="1200">
-                <a:solidFill>
-                  <a:schemeClr val="tx1"/>
-                </a:solidFill>
-                <a:latin typeface="+mn-lt"/>
-                <a:ea typeface="+mn-ea"/>
-                <a:cs typeface="+mn-cs"/>
-              </a:defRPr>
-            </a:lvl7pPr>
-            <a:lvl8pPr marL="5376672" indent="-358445" algn="l" defTabSz="716890" rtl="0" eaLnBrk="1" latinLnBrk="0" hangingPunct="1">
-              <a:spcBef>
-                <a:spcPct val="20000"/>
-              </a:spcBef>
-              <a:buFont typeface="Arial"/>
-              <a:buChar char="•"/>
-              <a:defRPr sz="3100" kern="1200">
-                <a:solidFill>
-                  <a:schemeClr val="tx1"/>
-                </a:solidFill>
-                <a:latin typeface="+mn-lt"/>
-                <a:ea typeface="+mn-ea"/>
-                <a:cs typeface="+mn-cs"/>
-              </a:defRPr>
-            </a:lvl8pPr>
-            <a:lvl9pPr marL="6093562" indent="-358445" algn="l" defTabSz="716890" rtl="0" eaLnBrk="1" latinLnBrk="0" hangingPunct="1">
-              <a:spcBef>
-                <a:spcPct val="20000"/>
-              </a:spcBef>
-              <a:buFont typeface="Arial"/>
-              <a:buChar char="•"/>
-              <a:defRPr sz="3100" kern="1200">
-                <a:solidFill>
-                  <a:schemeClr val="tx1"/>
-                </a:solidFill>
-                <a:latin typeface="+mn-lt"/>
-                <a:ea typeface="+mn-ea"/>
-                <a:cs typeface="+mn-cs"/>
-              </a:defRPr>
-            </a:lvl9pPr>
-          </a:lstStyle>
-          <a:p>
-            <a:pPr algn="ctr"/>
-            <a:endParaRPr lang="en-US" sz="4000" b="1" dirty="0" smtClean="0">
+              </a:rPr>
+              <a:t>Figure 1: System Overview</a:t>
+            </a:r>
+            <a:endParaRPr lang="en-AU" sz="1400" dirty="0">
               <a:latin typeface="Helvetica Neue" charset="0"/>
-              <a:cs typeface="Helvetica Neue" charset="0"/>
-            </a:endParaRPr>
-          </a:p>
-          <a:p>
-            <a:pPr algn="ctr"/>
-            <a:r>
-              <a:rPr lang="en-US" sz="4000" b="1" dirty="0" smtClean="0">
-                <a:latin typeface="Helvetica Neue" charset="0"/>
-                <a:cs typeface="Helvetica Neue" charset="0"/>
-              </a:rPr>
-              <a:t>I </a:t>
-            </a:r>
-            <a:r>
-              <a:rPr lang="en-US" sz="4000" b="1" dirty="0">
-                <a:latin typeface="Helvetica Neue" charset="0"/>
-                <a:cs typeface="Helvetica Neue" charset="0"/>
-              </a:rPr>
-              <a:t>think it would be good to add a </a:t>
-            </a:r>
-            <a:r>
-              <a:rPr lang="en-US" sz="4000" b="1" dirty="0" smtClean="0">
-                <a:latin typeface="Helvetica Neue" charset="0"/>
-                <a:cs typeface="Helvetica Neue" charset="0"/>
-              </a:rPr>
-              <a:t>large image here </a:t>
-            </a:r>
-            <a:r>
-              <a:rPr lang="en-US" sz="4000" b="1" dirty="0">
-                <a:latin typeface="Helvetica Neue" charset="0"/>
-                <a:cs typeface="Helvetica Neue" charset="0"/>
-              </a:rPr>
-              <a:t>of something to make our poster stand </a:t>
-            </a:r>
-            <a:r>
-              <a:rPr lang="en-US" sz="4000" b="1" dirty="0" smtClean="0">
-                <a:latin typeface="Helvetica Neue" charset="0"/>
-                <a:cs typeface="Helvetica Neue" charset="0"/>
-              </a:rPr>
-              <a:t>out</a:t>
-            </a:r>
-            <a:endParaRPr lang="en-US" sz="4000" b="1" dirty="0">
-              <a:latin typeface="Helvetica Neue" charset="0"/>
-              <a:cs typeface="Helvetica Neue" charset="0"/>
+              <a:cs typeface="Helvetica Neue"/>
             </a:endParaRPr>
           </a:p>
         </p:txBody>

</xml_diff>